<commit_message>
updated vandy people graph diagram
</commit_message>
<xml_diff>
--- a/2018-spring/vu-people/work-person-figure.pptx
+++ b/2018-spring/vu-people/work-person-figure.pptx
@@ -243,7 +243,7 @@
           <a:p>
             <a:fld id="{B07A0758-77D7-4282-B36F-462F42A79E32}" type="datetimeFigureOut">
               <a:rPr lang="en-US" smtClean="0"/>
-              <a:t>3/13/2018</a:t>
+              <a:t>3/18/2018</a:t>
             </a:fld>
             <a:endParaRPr lang="en-US"/>
           </a:p>
@@ -413,7 +413,7 @@
           <a:p>
             <a:fld id="{B07A0758-77D7-4282-B36F-462F42A79E32}" type="datetimeFigureOut">
               <a:rPr lang="en-US" smtClean="0"/>
-              <a:t>3/13/2018</a:t>
+              <a:t>3/18/2018</a:t>
             </a:fld>
             <a:endParaRPr lang="en-US"/>
           </a:p>
@@ -593,7 +593,7 @@
           <a:p>
             <a:fld id="{B07A0758-77D7-4282-B36F-462F42A79E32}" type="datetimeFigureOut">
               <a:rPr lang="en-US" smtClean="0"/>
-              <a:t>3/13/2018</a:t>
+              <a:t>3/18/2018</a:t>
             </a:fld>
             <a:endParaRPr lang="en-US"/>
           </a:p>
@@ -763,7 +763,7 @@
           <a:p>
             <a:fld id="{B07A0758-77D7-4282-B36F-462F42A79E32}" type="datetimeFigureOut">
               <a:rPr lang="en-US" smtClean="0"/>
-              <a:t>3/13/2018</a:t>
+              <a:t>3/18/2018</a:t>
             </a:fld>
             <a:endParaRPr lang="en-US"/>
           </a:p>
@@ -1007,7 +1007,7 @@
           <a:p>
             <a:fld id="{B07A0758-77D7-4282-B36F-462F42A79E32}" type="datetimeFigureOut">
               <a:rPr lang="en-US" smtClean="0"/>
-              <a:t>3/13/2018</a:t>
+              <a:t>3/18/2018</a:t>
             </a:fld>
             <a:endParaRPr lang="en-US"/>
           </a:p>
@@ -1239,7 +1239,7 @@
           <a:p>
             <a:fld id="{B07A0758-77D7-4282-B36F-462F42A79E32}" type="datetimeFigureOut">
               <a:rPr lang="en-US" smtClean="0"/>
-              <a:t>3/13/2018</a:t>
+              <a:t>3/18/2018</a:t>
             </a:fld>
             <a:endParaRPr lang="en-US"/>
           </a:p>
@@ -1606,7 +1606,7 @@
           <a:p>
             <a:fld id="{B07A0758-77D7-4282-B36F-462F42A79E32}" type="datetimeFigureOut">
               <a:rPr lang="en-US" smtClean="0"/>
-              <a:t>3/13/2018</a:t>
+              <a:t>3/18/2018</a:t>
             </a:fld>
             <a:endParaRPr lang="en-US"/>
           </a:p>
@@ -1724,7 +1724,7 @@
           <a:p>
             <a:fld id="{B07A0758-77D7-4282-B36F-462F42A79E32}" type="datetimeFigureOut">
               <a:rPr lang="en-US" smtClean="0"/>
-              <a:t>3/13/2018</a:t>
+              <a:t>3/18/2018</a:t>
             </a:fld>
             <a:endParaRPr lang="en-US"/>
           </a:p>
@@ -1819,7 +1819,7 @@
           <a:p>
             <a:fld id="{B07A0758-77D7-4282-B36F-462F42A79E32}" type="datetimeFigureOut">
               <a:rPr lang="en-US" smtClean="0"/>
-              <a:t>3/13/2018</a:t>
+              <a:t>3/18/2018</a:t>
             </a:fld>
             <a:endParaRPr lang="en-US"/>
           </a:p>
@@ -2096,7 +2096,7 @@
           <a:p>
             <a:fld id="{B07A0758-77D7-4282-B36F-462F42A79E32}" type="datetimeFigureOut">
               <a:rPr lang="en-US" smtClean="0"/>
-              <a:t>3/13/2018</a:t>
+              <a:t>3/18/2018</a:t>
             </a:fld>
             <a:endParaRPr lang="en-US"/>
           </a:p>
@@ -2353,7 +2353,7 @@
           <a:p>
             <a:fld id="{B07A0758-77D7-4282-B36F-462F42A79E32}" type="datetimeFigureOut">
               <a:rPr lang="en-US" smtClean="0"/>
-              <a:t>3/13/2018</a:t>
+              <a:t>3/18/2018</a:t>
             </a:fld>
             <a:endParaRPr lang="en-US"/>
           </a:p>
@@ -2566,7 +2566,7 @@
           <a:p>
             <a:fld id="{B07A0758-77D7-4282-B36F-462F42A79E32}" type="datetimeFigureOut">
               <a:rPr lang="en-US" smtClean="0"/>
-              <a:t>3/13/2018</a:t>
+              <a:t>3/18/2018</a:t>
             </a:fld>
             <a:endParaRPr lang="en-US"/>
           </a:p>
@@ -3133,8 +3133,8 @@
         </p:nvSpPr>
         <p:spPr>
           <a:xfrm>
-            <a:off x="2543747" y="4649702"/>
-            <a:ext cx="1579856" cy="338554"/>
+            <a:off x="2906423" y="4663509"/>
+            <a:ext cx="1001877" cy="338554"/>
           </a:xfrm>
           <a:prstGeom prst="rect">
             <a:avLst/>
@@ -3148,18 +3148,13 @@
           <a:lstStyle/>
           <a:p>
             <a:r>
-              <a:rPr lang="en-US" sz="1600">
+              <a:rPr lang="en-US" sz="1600" dirty="0">
                 <a:solidFill>
                   <a:schemeClr val="accent5"/>
                 </a:solidFill>
               </a:rPr>
-              <a:t>a foaf:Document</a:t>
-            </a:r>
-            <a:endParaRPr lang="en-US" sz="1600" dirty="0">
-              <a:solidFill>
-                <a:schemeClr val="accent5"/>
-              </a:solidFill>
-            </a:endParaRPr>
+              <a:t>[untyped]</a:t>
+            </a:r>
           </a:p>
         </p:txBody>
       </p:sp>
@@ -3196,13 +3191,14 @@
         <p:nvCxnSpPr>
           <p:cNvPr id="79" name="Straight Arrow Connector 78"/>
           <p:cNvCxnSpPr>
-            <a:stCxn id="82" idx="0"/>
-            <a:endCxn id="78" idx="4"/>
+            <a:cxnSpLocks/>
+            <a:stCxn id="78" idx="4"/>
+            <a:endCxn id="82" idx="0"/>
           </p:cNvCxnSpPr>
           <p:nvPr/>
         </p:nvCxnSpPr>
         <p:spPr>
-          <a:xfrm flipV="1">
+          <a:xfrm flipH="1">
             <a:off x="3345240" y="1215353"/>
             <a:ext cx="11565" cy="2982058"/>
           </a:xfrm>
@@ -3239,7 +3235,615 @@
         </p:nvSpPr>
         <p:spPr>
           <a:xfrm>
-            <a:off x="1658816" y="2106218"/>
+            <a:off x="2210143" y="2290883"/>
+            <a:ext cx="1146661" cy="369332"/>
+          </a:xfrm>
+          <a:prstGeom prst="rect">
+            <a:avLst/>
+          </a:prstGeom>
+          <a:noFill/>
+        </p:spPr>
+        <p:txBody>
+          <a:bodyPr wrap="none" rtlCol="0">
+            <a:spAutoFit/>
+          </a:bodyPr>
+          <a:lstStyle/>
+          <a:p>
+            <a:r>
+              <a:rPr lang="en-US" dirty="0">
+                <a:solidFill>
+                  <a:schemeClr val="accent5"/>
+                </a:solidFill>
+              </a:rPr>
+              <a:t>foaf:made</a:t>
+            </a:r>
+          </a:p>
+        </p:txBody>
+      </p:sp>
+      <p:sp>
+        <p:nvSpPr>
+          <p:cNvPr id="40" name="TextBox 39"/>
+          <p:cNvSpPr txBox="1"/>
+          <p:nvPr/>
+        </p:nvSpPr>
+        <p:spPr>
+          <a:xfrm>
+            <a:off x="4135168" y="1275221"/>
+            <a:ext cx="4926349" cy="2769989"/>
+          </a:xfrm>
+          <a:prstGeom prst="rect">
+            <a:avLst/>
+          </a:prstGeom>
+          <a:noFill/>
+        </p:spPr>
+        <p:txBody>
+          <a:bodyPr wrap="none" rtlCol="0">
+            <a:spAutoFit/>
+          </a:bodyPr>
+          <a:lstStyle/>
+          <a:p>
+            <a:r>
+              <a:rPr lang="en-US" dirty="0"/>
+              <a:t>Person datatype properties:</a:t>
+            </a:r>
+          </a:p>
+          <a:p>
+            <a:r>
+              <a:rPr lang="en-US" sz="1200" dirty="0">
+                <a:latin typeface="Courier New" panose="02070309020205020404" pitchFamily="49" charset="0"/>
+                <a:cs typeface="Courier New" panose="02070309020205020404" pitchFamily="49" charset="0"/>
+              </a:rPr>
+              <a:t>rdfs:label,foaf:name</a:t>
+            </a:r>
+          </a:p>
+          <a:p>
+            <a:r>
+              <a:rPr lang="en-US" sz="1200" dirty="0">
+                <a:latin typeface="Courier New" panose="02070309020205020404" pitchFamily="49" charset="0"/>
+                <a:cs typeface="Courier New" panose="02070309020205020404" pitchFamily="49" charset="0"/>
+              </a:rPr>
+              <a:t>(foaf:name used for alternatives)</a:t>
+            </a:r>
+          </a:p>
+          <a:p>
+            <a:r>
+              <a:rPr lang="en-US" sz="1200" dirty="0">
+                <a:latin typeface="Courier New" panose="02070309020205020404" pitchFamily="49" charset="0"/>
+                <a:cs typeface="Courier New" panose="02070309020205020404" pitchFamily="49" charset="0"/>
+              </a:rPr>
+              <a:t>foaf:givenName,schema:givenName</a:t>
+            </a:r>
+          </a:p>
+          <a:p>
+            <a:r>
+              <a:rPr lang="en-US" sz="1200" dirty="0">
+                <a:latin typeface="Courier New" panose="02070309020205020404" pitchFamily="49" charset="0"/>
+                <a:cs typeface="Courier New" panose="02070309020205020404" pitchFamily="49" charset="0"/>
+              </a:rPr>
+              <a:t>foaf:familyName,schema:familyName</a:t>
+            </a:r>
+          </a:p>
+          <a:p>
+            <a:r>
+              <a:rPr lang="en-US" sz="1200" dirty="0">
+                <a:latin typeface="Courier New" panose="02070309020205020404" pitchFamily="49" charset="0"/>
+                <a:cs typeface="Courier New" panose="02070309020205020404" pitchFamily="49" charset="0"/>
+              </a:rPr>
+              <a:t>dcterms:identifier</a:t>
+            </a:r>
+          </a:p>
+          <a:p>
+            <a:r>
+              <a:rPr lang="en-US" sz="1200" dirty="0">
+                <a:latin typeface="Courier New" panose="02070309020205020404" pitchFamily="49" charset="0"/>
+                <a:cs typeface="Courier New" panose="02070309020205020404" pitchFamily="49" charset="0"/>
+              </a:rPr>
+              <a:t>adhoc:identifierSource </a:t>
+            </a:r>
+            <a:r>
+              <a:rPr lang="en-US" sz="1200">
+                <a:latin typeface="Courier New" panose="02070309020205020404" pitchFamily="49" charset="0"/>
+                <a:cs typeface="Courier New" panose="02070309020205020404" pitchFamily="49" charset="0"/>
+              </a:rPr>
+              <a:t>(values: orcid,wikidata)</a:t>
+            </a:r>
+            <a:endParaRPr lang="en-US" sz="1200" dirty="0">
+              <a:latin typeface="Courier New" panose="02070309020205020404" pitchFamily="49" charset="0"/>
+              <a:cs typeface="Courier New" panose="02070309020205020404" pitchFamily="49" charset="0"/>
+            </a:endParaRPr>
+          </a:p>
+          <a:p>
+            <a:r>
+              <a:rPr lang="en-US" sz="1200" dirty="0">
+                <a:latin typeface="Courier New" panose="02070309020205020404" pitchFamily="49" charset="0"/>
+                <a:cs typeface="Courier New" panose="02070309020205020404" pitchFamily="49" charset="0"/>
+              </a:rPr>
+              <a:t>adhoc:status (values: student,employee)</a:t>
+            </a:r>
+          </a:p>
+          <a:p>
+            <a:r>
+              <a:rPr lang="en-US" sz="1200" dirty="0">
+                <a:latin typeface="Courier New" panose="02070309020205020404" pitchFamily="49" charset="0"/>
+                <a:cs typeface="Courier New" panose="02070309020205020404" pitchFamily="49" charset="0"/>
+              </a:rPr>
+              <a:t>adhoc:studentStart</a:t>
+            </a:r>
+            <a:r>
+              <a:rPr lang="en-US" sz="1200">
+                <a:latin typeface="Courier New" panose="02070309020205020404" pitchFamily="49" charset="0"/>
+                <a:cs typeface="Courier New" panose="02070309020205020404" pitchFamily="49" charset="0"/>
+              </a:rPr>
+              <a:t>, adhoc:studentEnd (ORCID only)</a:t>
+            </a:r>
+            <a:endParaRPr lang="en-US" sz="1200" dirty="0">
+              <a:latin typeface="Courier New" panose="02070309020205020404" pitchFamily="49" charset="0"/>
+              <a:cs typeface="Courier New" panose="02070309020205020404" pitchFamily="49" charset="0"/>
+            </a:endParaRPr>
+          </a:p>
+          <a:p>
+            <a:r>
+              <a:rPr lang="en-US" sz="1200" dirty="0">
+                <a:latin typeface="Courier New" panose="02070309020205020404" pitchFamily="49" charset="0"/>
+                <a:cs typeface="Courier New" panose="02070309020205020404" pitchFamily="49" charset="0"/>
+              </a:rPr>
+              <a:t>adhoc:employeeStart</a:t>
+            </a:r>
+            <a:r>
+              <a:rPr lang="en-US" sz="1200">
+                <a:latin typeface="Courier New" panose="02070309020205020404" pitchFamily="49" charset="0"/>
+                <a:cs typeface="Courier New" panose="02070309020205020404" pitchFamily="49" charset="0"/>
+              </a:rPr>
+              <a:t>, adhoc:employeeEnd (ORCID only)</a:t>
+            </a:r>
+          </a:p>
+          <a:p>
+            <a:r>
+              <a:rPr lang="en-US" sz="1200">
+                <a:latin typeface="Courier New" panose="02070309020205020404" pitchFamily="49" charset="0"/>
+                <a:cs typeface="Courier New" panose="02070309020205020404" pitchFamily="49" charset="0"/>
+              </a:rPr>
+              <a:t>dcterms:description (Wikidata only)</a:t>
+            </a:r>
+          </a:p>
+          <a:p>
+            <a:r>
+              <a:rPr lang="en-US" sz="1200">
+                <a:latin typeface="Courier New" panose="02070309020205020404" pitchFamily="49" charset="0"/>
+                <a:cs typeface="Courier New" panose="02070309020205020404" pitchFamily="49" charset="0"/>
+              </a:rPr>
+              <a:t>schema:birthdate (Wikidata only)</a:t>
+            </a:r>
+          </a:p>
+          <a:p>
+            <a:r>
+              <a:rPr lang="en-US" sz="1200">
+                <a:latin typeface="Courier New" panose="02070309020205020404" pitchFamily="49" charset="0"/>
+                <a:cs typeface="Courier New" panose="02070309020205020404" pitchFamily="49" charset="0"/>
+              </a:rPr>
+              <a:t>schema:gender (Wikidata only)</a:t>
+            </a:r>
+          </a:p>
+          <a:p>
+            <a:r>
+              <a:rPr lang="en-US" sz="1200">
+                <a:latin typeface="Courier New" panose="02070309020205020404" pitchFamily="49" charset="0"/>
+                <a:cs typeface="Courier New" panose="02070309020205020404" pitchFamily="49" charset="0"/>
+              </a:rPr>
+              <a:t>owl:sameAs (Wikidata only; link to ORCID URI)</a:t>
+            </a:r>
+          </a:p>
+        </p:txBody>
+      </p:sp>
+      <p:sp>
+        <p:nvSpPr>
+          <p:cNvPr id="41" name="TextBox 40"/>
+          <p:cNvSpPr txBox="1"/>
+          <p:nvPr/>
+        </p:nvSpPr>
+        <p:spPr>
+          <a:xfrm>
+            <a:off x="6297180" y="4388919"/>
+            <a:ext cx="2973891" cy="1477328"/>
+          </a:xfrm>
+          <a:prstGeom prst="rect">
+            <a:avLst/>
+          </a:prstGeom>
+          <a:noFill/>
+        </p:spPr>
+        <p:txBody>
+          <a:bodyPr wrap="none" rtlCol="0">
+            <a:spAutoFit/>
+          </a:bodyPr>
+          <a:lstStyle/>
+          <a:p>
+            <a:r>
+              <a:rPr lang="en-US" dirty="0"/>
+              <a:t>Work datatype properties:</a:t>
+            </a:r>
+          </a:p>
+          <a:p>
+            <a:r>
+              <a:rPr lang="en-US" sz="1200" dirty="0">
+                <a:latin typeface="Courier New" panose="02070309020205020404" pitchFamily="49" charset="0"/>
+                <a:cs typeface="Courier New" panose="02070309020205020404" pitchFamily="49" charset="0"/>
+              </a:rPr>
+              <a:t>dcterms:title</a:t>
+            </a:r>
+          </a:p>
+          <a:p>
+            <a:r>
+              <a:rPr lang="en-US" sz="1200" dirty="0">
+                <a:latin typeface="Courier New" panose="02070309020205020404" pitchFamily="49" charset="0"/>
+                <a:cs typeface="Courier New" panose="02070309020205020404" pitchFamily="49" charset="0"/>
+              </a:rPr>
+              <a:t>dcterms:publisher</a:t>
+            </a:r>
+          </a:p>
+          <a:p>
+            <a:r>
+              <a:rPr lang="en-US" sz="1200" dirty="0">
+                <a:latin typeface="Courier New" panose="02070309020205020404" pitchFamily="49" charset="0"/>
+                <a:cs typeface="Courier New" panose="02070309020205020404" pitchFamily="49" charset="0"/>
+              </a:rPr>
+              <a:t>dcterms:date (^^xsd:[various])</a:t>
+            </a:r>
+          </a:p>
+          <a:p>
+            <a:r>
+              <a:rPr lang="en-US" sz="1200" dirty="0">
+                <a:latin typeface="Courier New" panose="02070309020205020404" pitchFamily="49" charset="0"/>
+                <a:cs typeface="Courier New" panose="02070309020205020404" pitchFamily="49" charset="0"/>
+              </a:rPr>
+              <a:t>bibo:volume</a:t>
+            </a:r>
+          </a:p>
+          <a:p>
+            <a:r>
+              <a:rPr lang="en-US" sz="1200" dirty="0">
+                <a:latin typeface="Courier New" panose="02070309020205020404" pitchFamily="49" charset="0"/>
+                <a:cs typeface="Courier New" panose="02070309020205020404" pitchFamily="49" charset="0"/>
+              </a:rPr>
+              <a:t>bibo:pageStart</a:t>
+            </a:r>
+          </a:p>
+          <a:p>
+            <a:r>
+              <a:rPr lang="en-US" sz="1200" dirty="0">
+                <a:latin typeface="Courier New" panose="02070309020205020404" pitchFamily="49" charset="0"/>
+                <a:cs typeface="Courier New" panose="02070309020205020404" pitchFamily="49" charset="0"/>
+              </a:rPr>
+              <a:t>bibo:pageEnd</a:t>
+            </a:r>
+          </a:p>
+        </p:txBody>
+      </p:sp>
+      <p:sp>
+        <p:nvSpPr>
+          <p:cNvPr id="15" name="Oval 14">
+            <a:extLst>
+              <a:ext uri="{FF2B5EF4-FFF2-40B4-BE49-F238E27FC236}">
+                <a16:creationId xmlns:a16="http://schemas.microsoft.com/office/drawing/2014/main" id="{71C11D21-AD95-42D8-800A-17CC79624AC8}"/>
+              </a:ext>
+            </a:extLst>
+          </p:cNvPr>
+          <p:cNvSpPr/>
+          <p:nvPr/>
+        </p:nvSpPr>
+        <p:spPr>
+          <a:xfrm>
+            <a:off x="513330" y="5633776"/>
+            <a:ext cx="4521966" cy="837839"/>
+          </a:xfrm>
+          <a:prstGeom prst="ellipse">
+            <a:avLst/>
+          </a:prstGeom>
+          <a:noFill/>
+          <a:ln w="57150">
+            <a:solidFill>
+              <a:schemeClr val="accent1"/>
+            </a:solidFill>
+          </a:ln>
+        </p:spPr>
+        <p:style>
+          <a:lnRef idx="2">
+            <a:schemeClr val="accent1">
+              <a:shade val="50000"/>
+            </a:schemeClr>
+          </a:lnRef>
+          <a:fillRef idx="1">
+            <a:schemeClr val="accent1"/>
+          </a:fillRef>
+          <a:effectRef idx="0">
+            <a:schemeClr val="accent1"/>
+          </a:effectRef>
+          <a:fontRef idx="minor">
+            <a:schemeClr val="lt1"/>
+          </a:fontRef>
+        </p:style>
+        <p:txBody>
+          <a:bodyPr rtlCol="0" anchor="ctr"/>
+          <a:lstStyle/>
+          <a:p>
+            <a:pPr algn="ctr"/>
+            <a:endParaRPr lang="en-US"/>
+          </a:p>
+        </p:txBody>
+      </p:sp>
+      <p:sp>
+        <p:nvSpPr>
+          <p:cNvPr id="16" name="TextBox 15">
+            <a:extLst>
+              <a:ext uri="{FF2B5EF4-FFF2-40B4-BE49-F238E27FC236}">
+                <a16:creationId xmlns:a16="http://schemas.microsoft.com/office/drawing/2014/main" id="{4A64EB7F-ED4D-4E7C-9B18-B04DA9F7ABDB}"/>
+              </a:ext>
+            </a:extLst>
+          </p:cNvPr>
+          <p:cNvSpPr txBox="1"/>
+          <p:nvPr/>
+        </p:nvSpPr>
+        <p:spPr>
+          <a:xfrm>
+            <a:off x="1458736" y="6073534"/>
+            <a:ext cx="2481770" cy="338554"/>
+          </a:xfrm>
+          <a:prstGeom prst="rect">
+            <a:avLst/>
+          </a:prstGeom>
+          <a:noFill/>
+        </p:spPr>
+        <p:txBody>
+          <a:bodyPr wrap="none" rtlCol="0">
+            <a:spAutoFit/>
+          </a:bodyPr>
+          <a:lstStyle/>
+          <a:p>
+            <a:r>
+              <a:rPr lang="en-US" sz="1600" dirty="0">
+                <a:solidFill>
+                  <a:schemeClr val="accent5"/>
+                </a:solidFill>
+              </a:rPr>
+              <a:t>a bibo:Book or bibo:Journal</a:t>
+            </a:r>
+          </a:p>
+        </p:txBody>
+      </p:sp>
+      <p:sp>
+        <p:nvSpPr>
+          <p:cNvPr id="17" name="TextBox 16">
+            <a:extLst>
+              <a:ext uri="{FF2B5EF4-FFF2-40B4-BE49-F238E27FC236}">
+                <a16:creationId xmlns:a16="http://schemas.microsoft.com/office/drawing/2014/main" id="{BD688633-3EFF-43B5-B351-37ADE59FF438}"/>
+              </a:ext>
+            </a:extLst>
+          </p:cNvPr>
+          <p:cNvSpPr txBox="1"/>
+          <p:nvPr/>
+        </p:nvSpPr>
+        <p:spPr>
+          <a:xfrm>
+            <a:off x="692269" y="5798255"/>
+            <a:ext cx="4233467" cy="369332"/>
+          </a:xfrm>
+          <a:prstGeom prst="rect">
+            <a:avLst/>
+          </a:prstGeom>
+          <a:noFill/>
+        </p:spPr>
+        <p:txBody>
+          <a:bodyPr wrap="none" rtlCol="0">
+            <a:spAutoFit/>
+          </a:bodyPr>
+          <a:lstStyle/>
+          <a:p>
+            <a:r>
+              <a:rPr lang="en-US" dirty="0"/>
+              <a:t>http://id.crossref.org/isbn/9781118663202</a:t>
+            </a:r>
+          </a:p>
+        </p:txBody>
+      </p:sp>
+      <p:sp>
+        <p:nvSpPr>
+          <p:cNvPr id="18" name="TextBox 17">
+            <a:extLst>
+              <a:ext uri="{FF2B5EF4-FFF2-40B4-BE49-F238E27FC236}">
+                <a16:creationId xmlns:a16="http://schemas.microsoft.com/office/drawing/2014/main" id="{42E32433-0605-4098-95DF-697B71B630C2}"/>
+              </a:ext>
+            </a:extLst>
+          </p:cNvPr>
+          <p:cNvSpPr txBox="1"/>
+          <p:nvPr/>
+        </p:nvSpPr>
+        <p:spPr>
+          <a:xfrm>
+            <a:off x="5035296" y="6095441"/>
+            <a:ext cx="3402342" cy="738664"/>
+          </a:xfrm>
+          <a:prstGeom prst="rect">
+            <a:avLst/>
+          </a:prstGeom>
+          <a:noFill/>
+        </p:spPr>
+        <p:txBody>
+          <a:bodyPr wrap="none" rtlCol="0">
+            <a:spAutoFit/>
+          </a:bodyPr>
+          <a:lstStyle/>
+          <a:p>
+            <a:r>
+              <a:rPr lang="en-US" dirty="0"/>
+              <a:t>Journal/Book datatype properties:</a:t>
+            </a:r>
+          </a:p>
+          <a:p>
+            <a:r>
+              <a:rPr lang="en-US" sz="1200" dirty="0">
+                <a:latin typeface="Courier New" panose="02070309020205020404" pitchFamily="49" charset="0"/>
+                <a:cs typeface="Courier New" panose="02070309020205020404" pitchFamily="49" charset="0"/>
+              </a:rPr>
+              <a:t>dcterms:title (@en)</a:t>
+            </a:r>
+          </a:p>
+          <a:p>
+            <a:r>
+              <a:rPr lang="en-US" sz="1200" dirty="0">
+                <a:latin typeface="Courier New" panose="02070309020205020404" pitchFamily="49" charset="0"/>
+                <a:cs typeface="Courier New" panose="02070309020205020404" pitchFamily="49" charset="0"/>
+              </a:rPr>
+              <a:t>bibo:issn  (if serial)</a:t>
+            </a:r>
+          </a:p>
+        </p:txBody>
+      </p:sp>
+      <p:cxnSp>
+        <p:nvCxnSpPr>
+          <p:cNvPr id="19" name="Straight Arrow Connector 18">
+            <a:extLst>
+              <a:ext uri="{FF2B5EF4-FFF2-40B4-BE49-F238E27FC236}">
+                <a16:creationId xmlns:a16="http://schemas.microsoft.com/office/drawing/2014/main" id="{50C6550C-C5D0-4BD4-86CD-2190A2D7207E}"/>
+              </a:ext>
+            </a:extLst>
+          </p:cNvPr>
+          <p:cNvCxnSpPr>
+            <a:cxnSpLocks/>
+            <a:stCxn id="82" idx="4"/>
+            <a:endCxn id="15" idx="0"/>
+          </p:cNvCxnSpPr>
+          <p:nvPr/>
+        </p:nvCxnSpPr>
+        <p:spPr>
+          <a:xfrm flipH="1">
+            <a:off x="2774313" y="5035250"/>
+            <a:ext cx="570927" cy="598526"/>
+          </a:xfrm>
+          <a:prstGeom prst="straightConnector1">
+            <a:avLst/>
+          </a:prstGeom>
+          <a:ln w="63500">
+            <a:solidFill>
+              <a:schemeClr val="accent1"/>
+            </a:solidFill>
+            <a:tailEnd type="triangle" w="med" len="med"/>
+          </a:ln>
+        </p:spPr>
+        <p:style>
+          <a:lnRef idx="1">
+            <a:schemeClr val="accent1"/>
+          </a:lnRef>
+          <a:fillRef idx="0">
+            <a:schemeClr val="accent1"/>
+          </a:fillRef>
+          <a:effectRef idx="0">
+            <a:schemeClr val="accent1"/>
+          </a:effectRef>
+          <a:fontRef idx="minor">
+            <a:schemeClr val="tx1"/>
+          </a:fontRef>
+        </p:style>
+      </p:cxnSp>
+      <p:sp>
+        <p:nvSpPr>
+          <p:cNvPr id="22" name="TextBox 21">
+            <a:extLst>
+              <a:ext uri="{FF2B5EF4-FFF2-40B4-BE49-F238E27FC236}">
+                <a16:creationId xmlns:a16="http://schemas.microsoft.com/office/drawing/2014/main" id="{87013770-E2E5-4330-9752-73EECDB30F95}"/>
+              </a:ext>
+            </a:extLst>
+          </p:cNvPr>
+          <p:cNvSpPr txBox="1"/>
+          <p:nvPr/>
+        </p:nvSpPr>
+        <p:spPr>
+          <a:xfrm>
+            <a:off x="1022795" y="5115628"/>
+            <a:ext cx="1757789" cy="369332"/>
+          </a:xfrm>
+          <a:prstGeom prst="rect">
+            <a:avLst/>
+          </a:prstGeom>
+          <a:noFill/>
+        </p:spPr>
+        <p:txBody>
+          <a:bodyPr wrap="none" rtlCol="0">
+            <a:spAutoFit/>
+          </a:bodyPr>
+          <a:lstStyle/>
+          <a:p>
+            <a:r>
+              <a:rPr lang="en-US" dirty="0">
+                <a:solidFill>
+                  <a:schemeClr val="accent5"/>
+                </a:solidFill>
+              </a:rPr>
+              <a:t>dcterms:isPartOf</a:t>
+            </a:r>
+          </a:p>
+        </p:txBody>
+      </p:sp>
+      <p:cxnSp>
+        <p:nvCxnSpPr>
+          <p:cNvPr id="23" name="Straight Arrow Connector 22">
+            <a:extLst>
+              <a:ext uri="{FF2B5EF4-FFF2-40B4-BE49-F238E27FC236}">
+                <a16:creationId xmlns:a16="http://schemas.microsoft.com/office/drawing/2014/main" id="{57189E37-329F-4386-8ABD-B2CDBE7E9E6C}"/>
+              </a:ext>
+            </a:extLst>
+          </p:cNvPr>
+          <p:cNvCxnSpPr>
+            <a:cxnSpLocks/>
+            <a:stCxn id="82" idx="1"/>
+            <a:endCxn id="78" idx="3"/>
+          </p:cNvCxnSpPr>
+          <p:nvPr/>
+        </p:nvCxnSpPr>
+        <p:spPr>
+          <a:xfrm flipV="1">
+            <a:off x="1342777" y="1093079"/>
+            <a:ext cx="503736" cy="3227031"/>
+          </a:xfrm>
+          <a:prstGeom prst="straightConnector1">
+            <a:avLst/>
+          </a:prstGeom>
+          <a:ln w="63500">
+            <a:solidFill>
+              <a:schemeClr val="accent1"/>
+            </a:solidFill>
+            <a:prstDash val="dash"/>
+            <a:tailEnd type="triangle" w="med" len="med"/>
+          </a:ln>
+        </p:spPr>
+        <p:style>
+          <a:lnRef idx="1">
+            <a:schemeClr val="accent1"/>
+          </a:lnRef>
+          <a:fillRef idx="0">
+            <a:schemeClr val="accent1"/>
+          </a:fillRef>
+          <a:effectRef idx="0">
+            <a:schemeClr val="accent1"/>
+          </a:effectRef>
+          <a:fontRef idx="minor">
+            <a:schemeClr val="tx1"/>
+          </a:fontRef>
+        </p:style>
+      </p:cxnSp>
+      <p:sp>
+        <p:nvSpPr>
+          <p:cNvPr id="27" name="TextBox 26">
+            <a:extLst>
+              <a:ext uri="{FF2B5EF4-FFF2-40B4-BE49-F238E27FC236}">
+                <a16:creationId xmlns:a16="http://schemas.microsoft.com/office/drawing/2014/main" id="{27BF3F0F-9DD9-454F-B84E-0ED7937BA671}"/>
+              </a:ext>
+            </a:extLst>
+          </p:cNvPr>
+          <p:cNvSpPr txBox="1"/>
+          <p:nvPr/>
+        </p:nvSpPr>
+        <p:spPr>
+          <a:xfrm>
+            <a:off x="110384" y="1529439"/>
             <a:ext cx="1686424" cy="369332"/>
           </a:xfrm>
           <a:prstGeom prst="rect">
@@ -3266,320 +3870,34 @@
       </p:sp>
       <p:sp>
         <p:nvSpPr>
-          <p:cNvPr id="40" name="TextBox 39"/>
-          <p:cNvSpPr txBox="1"/>
+          <p:cNvPr id="10" name="Rectangle 9">
+            <a:extLst>
+              <a:ext uri="{FF2B5EF4-FFF2-40B4-BE49-F238E27FC236}">
+                <a16:creationId xmlns:a16="http://schemas.microsoft.com/office/drawing/2014/main" id="{1F1E891D-5AD7-49CF-8DAE-E72EC50A52D3}"/>
+              </a:ext>
+            </a:extLst>
+          </p:cNvPr>
+          <p:cNvSpPr/>
           <p:nvPr/>
         </p:nvSpPr>
         <p:spPr>
           <a:xfrm>
-            <a:off x="4135168" y="1275221"/>
-            <a:ext cx="4926349" cy="2769989"/>
+            <a:off x="82483" y="1323706"/>
+            <a:ext cx="4572000" cy="276999"/>
           </a:xfrm>
           <a:prstGeom prst="rect">
             <a:avLst/>
           </a:prstGeom>
-          <a:noFill/>
-        </p:spPr>
-        <p:txBody>
-          <a:bodyPr wrap="none" rtlCol="0">
+        </p:spPr>
+        <p:txBody>
+          <a:bodyPr>
             <a:spAutoFit/>
           </a:bodyPr>
           <a:lstStyle/>
           <a:p>
             <a:r>
-              <a:rPr lang="en-US" dirty="0"/>
-              <a:t>Person datatype properties:</a:t>
-            </a:r>
-          </a:p>
-          <a:p>
-            <a:r>
-              <a:rPr lang="en-US" sz="1200" dirty="0">
-                <a:latin typeface="Courier New" panose="02070309020205020404" pitchFamily="49" charset="0"/>
-                <a:cs typeface="Courier New" panose="02070309020205020404" pitchFamily="49" charset="0"/>
-              </a:rPr>
-              <a:t>rdfs:label,foaf:name</a:t>
-            </a:r>
-          </a:p>
-          <a:p>
-            <a:r>
-              <a:rPr lang="en-US" sz="1200" dirty="0">
-                <a:latin typeface="Courier New" panose="02070309020205020404" pitchFamily="49" charset="0"/>
-                <a:cs typeface="Courier New" panose="02070309020205020404" pitchFamily="49" charset="0"/>
-              </a:rPr>
-              <a:t>(foaf:name used for alternatives)</a:t>
-            </a:r>
-          </a:p>
-          <a:p>
-            <a:r>
-              <a:rPr lang="en-US" sz="1200" dirty="0">
-                <a:latin typeface="Courier New" panose="02070309020205020404" pitchFamily="49" charset="0"/>
-                <a:cs typeface="Courier New" panose="02070309020205020404" pitchFamily="49" charset="0"/>
-              </a:rPr>
-              <a:t>foaf:givenName,schema:givenName</a:t>
-            </a:r>
-          </a:p>
-          <a:p>
-            <a:r>
-              <a:rPr lang="en-US" sz="1200" dirty="0">
-                <a:latin typeface="Courier New" panose="02070309020205020404" pitchFamily="49" charset="0"/>
-                <a:cs typeface="Courier New" panose="02070309020205020404" pitchFamily="49" charset="0"/>
-              </a:rPr>
-              <a:t>foaf:familyName,schema:familyName</a:t>
-            </a:r>
-          </a:p>
-          <a:p>
-            <a:r>
-              <a:rPr lang="en-US" sz="1200" dirty="0">
-                <a:latin typeface="Courier New" panose="02070309020205020404" pitchFamily="49" charset="0"/>
-                <a:cs typeface="Courier New" panose="02070309020205020404" pitchFamily="49" charset="0"/>
-              </a:rPr>
-              <a:t>dcterms:identifier</a:t>
-            </a:r>
-          </a:p>
-          <a:p>
-            <a:r>
-              <a:rPr lang="en-US" sz="1200" dirty="0">
-                <a:latin typeface="Courier New" panose="02070309020205020404" pitchFamily="49" charset="0"/>
-                <a:cs typeface="Courier New" panose="02070309020205020404" pitchFamily="49" charset="0"/>
-              </a:rPr>
-              <a:t>adhoc:identifierSource </a:t>
-            </a:r>
-            <a:r>
-              <a:rPr lang="en-US" sz="1200">
-                <a:latin typeface="Courier New" panose="02070309020205020404" pitchFamily="49" charset="0"/>
-                <a:cs typeface="Courier New" panose="02070309020205020404" pitchFamily="49" charset="0"/>
-              </a:rPr>
-              <a:t>(</a:t>
-            </a:r>
-            <a:r>
-              <a:rPr lang="en-US" sz="1200" smtClean="0">
-                <a:latin typeface="Courier New" panose="02070309020205020404" pitchFamily="49" charset="0"/>
-                <a:cs typeface="Courier New" panose="02070309020205020404" pitchFamily="49" charset="0"/>
-              </a:rPr>
-              <a:t>values: orcid,wikidata)</a:t>
-            </a:r>
-            <a:endParaRPr lang="en-US" sz="1200" dirty="0">
-              <a:latin typeface="Courier New" panose="02070309020205020404" pitchFamily="49" charset="0"/>
-              <a:cs typeface="Courier New" panose="02070309020205020404" pitchFamily="49" charset="0"/>
-            </a:endParaRPr>
-          </a:p>
-          <a:p>
-            <a:r>
-              <a:rPr lang="en-US" sz="1200" dirty="0">
-                <a:latin typeface="Courier New" panose="02070309020205020404" pitchFamily="49" charset="0"/>
-                <a:cs typeface="Courier New" panose="02070309020205020404" pitchFamily="49" charset="0"/>
-              </a:rPr>
-              <a:t>adhoc:status (values: student,employee)</a:t>
-            </a:r>
-          </a:p>
-          <a:p>
-            <a:r>
-              <a:rPr lang="en-US" sz="1200" dirty="0">
-                <a:latin typeface="Courier New" panose="02070309020205020404" pitchFamily="49" charset="0"/>
-                <a:cs typeface="Courier New" panose="02070309020205020404" pitchFamily="49" charset="0"/>
-              </a:rPr>
-              <a:t>adhoc:studentStart</a:t>
-            </a:r>
-            <a:r>
-              <a:rPr lang="en-US" sz="1200">
-                <a:latin typeface="Courier New" panose="02070309020205020404" pitchFamily="49" charset="0"/>
-                <a:cs typeface="Courier New" panose="02070309020205020404" pitchFamily="49" charset="0"/>
-              </a:rPr>
-              <a:t>, </a:t>
-            </a:r>
-            <a:r>
-              <a:rPr lang="en-US" sz="1200" smtClean="0">
-                <a:latin typeface="Courier New" panose="02070309020205020404" pitchFamily="49" charset="0"/>
-                <a:cs typeface="Courier New" panose="02070309020205020404" pitchFamily="49" charset="0"/>
-              </a:rPr>
-              <a:t>adhoc:studentEnd (ORCID only)</a:t>
-            </a:r>
-            <a:endParaRPr lang="en-US" sz="1200" dirty="0">
-              <a:latin typeface="Courier New" panose="02070309020205020404" pitchFamily="49" charset="0"/>
-              <a:cs typeface="Courier New" panose="02070309020205020404" pitchFamily="49" charset="0"/>
-            </a:endParaRPr>
-          </a:p>
-          <a:p>
-            <a:r>
-              <a:rPr lang="en-US" sz="1200" dirty="0">
-                <a:latin typeface="Courier New" panose="02070309020205020404" pitchFamily="49" charset="0"/>
-                <a:cs typeface="Courier New" panose="02070309020205020404" pitchFamily="49" charset="0"/>
-              </a:rPr>
-              <a:t>adhoc:employeeStart</a:t>
-            </a:r>
-            <a:r>
-              <a:rPr lang="en-US" sz="1200">
-                <a:latin typeface="Courier New" panose="02070309020205020404" pitchFamily="49" charset="0"/>
-                <a:cs typeface="Courier New" panose="02070309020205020404" pitchFamily="49" charset="0"/>
-              </a:rPr>
-              <a:t>, </a:t>
-            </a:r>
-            <a:r>
-              <a:rPr lang="en-US" sz="1200">
-                <a:latin typeface="Courier New" panose="02070309020205020404" pitchFamily="49" charset="0"/>
-                <a:cs typeface="Courier New" panose="02070309020205020404" pitchFamily="49" charset="0"/>
-              </a:rPr>
-              <a:t>adhoc:employeeEnd (ORCID </a:t>
-            </a:r>
-            <a:r>
-              <a:rPr lang="en-US" sz="1200">
-                <a:latin typeface="Courier New" panose="02070309020205020404" pitchFamily="49" charset="0"/>
-                <a:cs typeface="Courier New" panose="02070309020205020404" pitchFamily="49" charset="0"/>
-              </a:rPr>
-              <a:t>only</a:t>
-            </a:r>
-            <a:r>
-              <a:rPr lang="en-US" sz="1200" smtClean="0">
-                <a:latin typeface="Courier New" panose="02070309020205020404" pitchFamily="49" charset="0"/>
-                <a:cs typeface="Courier New" panose="02070309020205020404" pitchFamily="49" charset="0"/>
-              </a:rPr>
-              <a:t>)</a:t>
-            </a:r>
-          </a:p>
-          <a:p>
-            <a:r>
-              <a:rPr lang="en-US" sz="1200" smtClean="0">
-                <a:latin typeface="Courier New" panose="02070309020205020404" pitchFamily="49" charset="0"/>
-                <a:cs typeface="Courier New" panose="02070309020205020404" pitchFamily="49" charset="0"/>
-              </a:rPr>
-              <a:t>dcterms:description (Wikidata only)</a:t>
-            </a:r>
-          </a:p>
-          <a:p>
-            <a:r>
-              <a:rPr lang="en-US" sz="1200" smtClean="0">
-                <a:latin typeface="Courier New" panose="02070309020205020404" pitchFamily="49" charset="0"/>
-                <a:cs typeface="Courier New" panose="02070309020205020404" pitchFamily="49" charset="0"/>
-              </a:rPr>
-              <a:t>schema:birthdate </a:t>
-            </a:r>
-            <a:r>
-              <a:rPr lang="en-US" sz="1200">
-                <a:latin typeface="Courier New" panose="02070309020205020404" pitchFamily="49" charset="0"/>
-                <a:cs typeface="Courier New" panose="02070309020205020404" pitchFamily="49" charset="0"/>
-              </a:rPr>
-              <a:t>(Wikidata only)</a:t>
-            </a:r>
-            <a:endParaRPr lang="en-US" sz="1200" smtClean="0">
-              <a:latin typeface="Courier New" panose="02070309020205020404" pitchFamily="49" charset="0"/>
-              <a:cs typeface="Courier New" panose="02070309020205020404" pitchFamily="49" charset="0"/>
-            </a:endParaRPr>
-          </a:p>
-          <a:p>
-            <a:r>
-              <a:rPr lang="en-US" sz="1200" smtClean="0">
-                <a:latin typeface="Courier New" panose="02070309020205020404" pitchFamily="49" charset="0"/>
-                <a:cs typeface="Courier New" panose="02070309020205020404" pitchFamily="49" charset="0"/>
-              </a:rPr>
-              <a:t>schema:gender </a:t>
-            </a:r>
-            <a:r>
-              <a:rPr lang="en-US" sz="1200">
-                <a:latin typeface="Courier New" panose="02070309020205020404" pitchFamily="49" charset="0"/>
-                <a:cs typeface="Courier New" panose="02070309020205020404" pitchFamily="49" charset="0"/>
-              </a:rPr>
-              <a:t>(Wikidata </a:t>
-            </a:r>
-            <a:r>
-              <a:rPr lang="en-US" sz="1200">
-                <a:latin typeface="Courier New" panose="02070309020205020404" pitchFamily="49" charset="0"/>
-                <a:cs typeface="Courier New" panose="02070309020205020404" pitchFamily="49" charset="0"/>
-              </a:rPr>
-              <a:t>only</a:t>
-            </a:r>
-            <a:r>
-              <a:rPr lang="en-US" sz="1200" smtClean="0">
-                <a:latin typeface="Courier New" panose="02070309020205020404" pitchFamily="49" charset="0"/>
-                <a:cs typeface="Courier New" panose="02070309020205020404" pitchFamily="49" charset="0"/>
-              </a:rPr>
-              <a:t>)</a:t>
-            </a:r>
-          </a:p>
-          <a:p>
-            <a:r>
-              <a:rPr lang="en-US" sz="1200" smtClean="0">
-                <a:latin typeface="Courier New" panose="02070309020205020404" pitchFamily="49" charset="0"/>
-                <a:cs typeface="Courier New" panose="02070309020205020404" pitchFamily="49" charset="0"/>
-              </a:rPr>
-              <a:t>owl:sameAs (Wikidata only; link to ORCID URI)</a:t>
-            </a:r>
-            <a:endParaRPr lang="en-US" sz="1200">
-              <a:latin typeface="Courier New" panose="02070309020205020404" pitchFamily="49" charset="0"/>
-              <a:cs typeface="Courier New" panose="02070309020205020404" pitchFamily="49" charset="0"/>
-            </a:endParaRPr>
-          </a:p>
-        </p:txBody>
-      </p:sp>
-      <p:sp>
-        <p:nvSpPr>
-          <p:cNvPr id="41" name="TextBox 40"/>
-          <p:cNvSpPr txBox="1"/>
-          <p:nvPr/>
-        </p:nvSpPr>
-        <p:spPr>
-          <a:xfrm>
-            <a:off x="5269099" y="5062656"/>
-            <a:ext cx="2658485" cy="1292662"/>
-          </a:xfrm>
-          <a:prstGeom prst="rect">
-            <a:avLst/>
-          </a:prstGeom>
-          <a:noFill/>
-        </p:spPr>
-        <p:txBody>
-          <a:bodyPr wrap="none" rtlCol="0">
-            <a:spAutoFit/>
-          </a:bodyPr>
-          <a:lstStyle/>
-          <a:p>
-            <a:r>
-              <a:rPr lang="en-US" dirty="0"/>
-              <a:t>Work datatype properties:</a:t>
-            </a:r>
-          </a:p>
-          <a:p>
-            <a:r>
-              <a:rPr lang="en-US" sz="1200" dirty="0">
-                <a:latin typeface="Courier New" panose="02070309020205020404" pitchFamily="49" charset="0"/>
-                <a:cs typeface="Courier New" panose="02070309020205020404" pitchFamily="49" charset="0"/>
-              </a:rPr>
-              <a:t>rdfs:label (@en)</a:t>
-            </a:r>
-          </a:p>
-          <a:p>
-            <a:r>
-              <a:rPr lang="en-US" sz="1200" dirty="0">
-                <a:latin typeface="Courier New" panose="02070309020205020404" pitchFamily="49" charset="0"/>
-                <a:cs typeface="Courier New" panose="02070309020205020404" pitchFamily="49" charset="0"/>
-              </a:rPr>
-              <a:t>dcterms:title (@en)</a:t>
-            </a:r>
-          </a:p>
-          <a:p>
-            <a:r>
-              <a:rPr lang="en-US" sz="1200" dirty="0">
-                <a:latin typeface="Courier New" panose="02070309020205020404" pitchFamily="49" charset="0"/>
-                <a:cs typeface="Courier New" panose="02070309020205020404" pitchFamily="49" charset="0"/>
-              </a:rPr>
-              <a:t>dcterms:date (^^xsd:date)</a:t>
-            </a:r>
-          </a:p>
-          <a:p>
-            <a:r>
-              <a:rPr lang="en-US" sz="1200" dirty="0">
-                <a:latin typeface="Courier New" panose="02070309020205020404" pitchFamily="49" charset="0"/>
-                <a:cs typeface="Courier New" panose="02070309020205020404" pitchFamily="49" charset="0"/>
-              </a:rPr>
-              <a:t>bibo:pageStart</a:t>
-            </a:r>
-          </a:p>
-          <a:p>
-            <a:r>
-              <a:rPr lang="en-US" sz="1200" dirty="0">
-                <a:latin typeface="Courier New" panose="02070309020205020404" pitchFamily="49" charset="0"/>
-                <a:cs typeface="Courier New" panose="02070309020205020404" pitchFamily="49" charset="0"/>
-              </a:rPr>
-              <a:t>bibo:pageEnd</a:t>
+              <a:rPr lang="en-US" sz="1200" dirty="0"/>
+              <a:t>http://id.crossref.org/contributor/shaul-kelner-bw2aspu35zym</a:t>
             </a:r>
           </a:p>
         </p:txBody>

</xml_diff>